<commit_message>
Added balance book skeleton.
</commit_message>
<xml_diff>
--- a/IPM_Mockup.pptx
+++ b/IPM_Mockup.pptx
@@ -200,7 +200,7 @@
           <a:p>
             <a:fld id="{642EBFA8-2302-4239-AB49-C5D0BEEAEFA2}" type="datetimeFigureOut">
               <a:rPr lang="en-US" smtClean="0"/>
-              <a:t>12/4/2015</a:t>
+              <a:t>12/6/2015</a:t>
             </a:fld>
             <a:endParaRPr lang="en-US"/>
           </a:p>
@@ -733,7 +733,7 @@
           <a:p>
             <a:fld id="{ACB0442B-F23F-4FD9-9DD5-6FB15E01333B}" type="datetimeFigureOut">
               <a:rPr lang="en-US" smtClean="0"/>
-              <a:t>12/4/2015</a:t>
+              <a:t>12/6/2015</a:t>
             </a:fld>
             <a:endParaRPr lang="en-US"/>
           </a:p>
@@ -898,7 +898,7 @@
           <a:p>
             <a:fld id="{ACB0442B-F23F-4FD9-9DD5-6FB15E01333B}" type="datetimeFigureOut">
               <a:rPr lang="en-US" smtClean="0"/>
-              <a:t>12/4/2015</a:t>
+              <a:t>12/6/2015</a:t>
             </a:fld>
             <a:endParaRPr lang="en-US"/>
           </a:p>
@@ -1073,7 +1073,7 @@
           <a:p>
             <a:fld id="{ACB0442B-F23F-4FD9-9DD5-6FB15E01333B}" type="datetimeFigureOut">
               <a:rPr lang="en-US" smtClean="0"/>
-              <a:t>12/4/2015</a:t>
+              <a:t>12/6/2015</a:t>
             </a:fld>
             <a:endParaRPr lang="en-US"/>
           </a:p>
@@ -1238,7 +1238,7 @@
           <a:p>
             <a:fld id="{ACB0442B-F23F-4FD9-9DD5-6FB15E01333B}" type="datetimeFigureOut">
               <a:rPr lang="en-US" smtClean="0"/>
-              <a:t>12/4/2015</a:t>
+              <a:t>12/6/2015</a:t>
             </a:fld>
             <a:endParaRPr lang="en-US"/>
           </a:p>
@@ -1479,7 +1479,7 @@
           <a:p>
             <a:fld id="{ACB0442B-F23F-4FD9-9DD5-6FB15E01333B}" type="datetimeFigureOut">
               <a:rPr lang="en-US" smtClean="0"/>
-              <a:t>12/4/2015</a:t>
+              <a:t>12/6/2015</a:t>
             </a:fld>
             <a:endParaRPr lang="en-US"/>
           </a:p>
@@ -1762,7 +1762,7 @@
           <a:p>
             <a:fld id="{ACB0442B-F23F-4FD9-9DD5-6FB15E01333B}" type="datetimeFigureOut">
               <a:rPr lang="en-US" smtClean="0"/>
-              <a:t>12/4/2015</a:t>
+              <a:t>12/6/2015</a:t>
             </a:fld>
             <a:endParaRPr lang="en-US"/>
           </a:p>
@@ -2179,7 +2179,7 @@
           <a:p>
             <a:fld id="{ACB0442B-F23F-4FD9-9DD5-6FB15E01333B}" type="datetimeFigureOut">
               <a:rPr lang="en-US" smtClean="0"/>
-              <a:t>12/4/2015</a:t>
+              <a:t>12/6/2015</a:t>
             </a:fld>
             <a:endParaRPr lang="en-US"/>
           </a:p>
@@ -2292,7 +2292,7 @@
           <a:p>
             <a:fld id="{ACB0442B-F23F-4FD9-9DD5-6FB15E01333B}" type="datetimeFigureOut">
               <a:rPr lang="en-US" smtClean="0"/>
-              <a:t>12/4/2015</a:t>
+              <a:t>12/6/2015</a:t>
             </a:fld>
             <a:endParaRPr lang="en-US"/>
           </a:p>
@@ -2382,7 +2382,7 @@
           <a:p>
             <a:fld id="{ACB0442B-F23F-4FD9-9DD5-6FB15E01333B}" type="datetimeFigureOut">
               <a:rPr lang="en-US" smtClean="0"/>
-              <a:t>12/4/2015</a:t>
+              <a:t>12/6/2015</a:t>
             </a:fld>
             <a:endParaRPr lang="en-US"/>
           </a:p>
@@ -2654,7 +2654,7 @@
           <a:p>
             <a:fld id="{ACB0442B-F23F-4FD9-9DD5-6FB15E01333B}" type="datetimeFigureOut">
               <a:rPr lang="en-US" smtClean="0"/>
-              <a:t>12/4/2015</a:t>
+              <a:t>12/6/2015</a:t>
             </a:fld>
             <a:endParaRPr lang="en-US"/>
           </a:p>
@@ -2902,7 +2902,7 @@
           <a:p>
             <a:fld id="{ACB0442B-F23F-4FD9-9DD5-6FB15E01333B}" type="datetimeFigureOut">
               <a:rPr lang="en-US" smtClean="0"/>
-              <a:t>12/4/2015</a:t>
+              <a:t>12/6/2015</a:t>
             </a:fld>
             <a:endParaRPr lang="en-US"/>
           </a:p>
@@ -3110,7 +3110,7 @@
           <a:p>
             <a:fld id="{ACB0442B-F23F-4FD9-9DD5-6FB15E01333B}" type="datetimeFigureOut">
               <a:rPr lang="en-US" smtClean="0"/>
-              <a:t>12/4/2015</a:t>
+              <a:t>12/6/2015</a:t>
             </a:fld>
             <a:endParaRPr lang="en-US"/>
           </a:p>
@@ -10803,250 +10803,6 @@
       </p:grpSpPr>
       <p:sp>
         <p:nvSpPr>
-          <p:cNvPr id="78" name="Rectangle 77"/>
-          <p:cNvSpPr/>
-          <p:nvPr/>
-        </p:nvSpPr>
-        <p:spPr>
-          <a:xfrm>
-            <a:off x="152400" y="685800"/>
-            <a:ext cx="1905000" cy="6019800"/>
-          </a:xfrm>
-          <a:prstGeom prst="rect">
-            <a:avLst/>
-          </a:prstGeom>
-        </p:spPr>
-        <p:style>
-          <a:lnRef idx="2">
-            <a:schemeClr val="accent1">
-              <a:shade val="50000"/>
-            </a:schemeClr>
-          </a:lnRef>
-          <a:fillRef idx="1">
-            <a:schemeClr val="accent1"/>
-          </a:fillRef>
-          <a:effectRef idx="0">
-            <a:schemeClr val="accent1"/>
-          </a:effectRef>
-          <a:fontRef idx="minor">
-            <a:schemeClr val="lt1"/>
-          </a:fontRef>
-        </p:style>
-        <p:txBody>
-          <a:bodyPr rtlCol="0" anchor="ctr"/>
-          <a:lstStyle/>
-          <a:p>
-            <a:pPr algn="ctr"/>
-            <a:endParaRPr lang="en-US"/>
-          </a:p>
-        </p:txBody>
-      </p:sp>
-      <p:sp>
-        <p:nvSpPr>
-          <p:cNvPr id="6" name="Rectangle 5"/>
-          <p:cNvSpPr/>
-          <p:nvPr/>
-        </p:nvSpPr>
-        <p:spPr>
-          <a:xfrm>
-            <a:off x="152400" y="152400"/>
-            <a:ext cx="1905000" cy="457200"/>
-          </a:xfrm>
-          <a:prstGeom prst="rect">
-            <a:avLst/>
-          </a:prstGeom>
-          <a:solidFill>
-            <a:schemeClr val="bg1">
-              <a:lumMod val="95000"/>
-            </a:schemeClr>
-          </a:solidFill>
-          <a:ln w="19050"/>
-        </p:spPr>
-        <p:style>
-          <a:lnRef idx="2">
-            <a:schemeClr val="accent1"/>
-          </a:lnRef>
-          <a:fillRef idx="1">
-            <a:schemeClr val="lt1"/>
-          </a:fillRef>
-          <a:effectRef idx="0">
-            <a:schemeClr val="accent1"/>
-          </a:effectRef>
-          <a:fontRef idx="minor">
-            <a:schemeClr val="dk1"/>
-          </a:fontRef>
-        </p:style>
-        <p:txBody>
-          <a:bodyPr rtlCol="0" anchor="ctr"/>
-          <a:lstStyle/>
-          <a:p>
-            <a:pPr algn="ctr"/>
-            <a:r>
-              <a:rPr lang="en-US" sz="1200" dirty="0" smtClean="0"/>
-              <a:t>Max’s Portfolio</a:t>
-            </a:r>
-            <a:endParaRPr lang="en-US" sz="1200" dirty="0"/>
-          </a:p>
-        </p:txBody>
-      </p:sp>
-      <p:sp>
-        <p:nvSpPr>
-          <p:cNvPr id="91" name="Rectangle 90"/>
-          <p:cNvSpPr/>
-          <p:nvPr/>
-        </p:nvSpPr>
-        <p:spPr>
-          <a:xfrm>
-            <a:off x="2133600" y="152400"/>
-            <a:ext cx="6858000" cy="457200"/>
-          </a:xfrm>
-          <a:prstGeom prst="rect">
-            <a:avLst/>
-          </a:prstGeom>
-          <a:solidFill>
-            <a:schemeClr val="bg1">
-              <a:lumMod val="95000"/>
-            </a:schemeClr>
-          </a:solidFill>
-          <a:ln w="19050"/>
-        </p:spPr>
-        <p:style>
-          <a:lnRef idx="2">
-            <a:schemeClr val="accent1"/>
-          </a:lnRef>
-          <a:fillRef idx="1">
-            <a:schemeClr val="lt1"/>
-          </a:fillRef>
-          <a:effectRef idx="0">
-            <a:schemeClr val="accent1"/>
-          </a:effectRef>
-          <a:fontRef idx="minor">
-            <a:schemeClr val="dk1"/>
-          </a:fontRef>
-        </p:style>
-        <p:txBody>
-          <a:bodyPr rtlCol="0" anchor="ctr"/>
-          <a:lstStyle/>
-          <a:p>
-            <a:pPr algn="ctr"/>
-            <a:r>
-              <a:rPr lang="en-US" sz="2400" dirty="0" smtClean="0"/>
-              <a:t>RBC RESP DI</a:t>
-            </a:r>
-            <a:endParaRPr lang="en-US" sz="2400" dirty="0"/>
-          </a:p>
-        </p:txBody>
-      </p:sp>
-      <p:sp>
-        <p:nvSpPr>
-          <p:cNvPr id="92" name="TextBox 91"/>
-          <p:cNvSpPr txBox="1"/>
-          <p:nvPr/>
-        </p:nvSpPr>
-        <p:spPr>
-          <a:xfrm>
-            <a:off x="152400" y="685800"/>
-            <a:ext cx="1905000" cy="307777"/>
-          </a:xfrm>
-          <a:prstGeom prst="rect">
-            <a:avLst/>
-          </a:prstGeom>
-          <a:solidFill>
-            <a:schemeClr val="bg1"/>
-          </a:solidFill>
-        </p:spPr>
-        <p:txBody>
-          <a:bodyPr wrap="square" rtlCol="0">
-            <a:spAutoFit/>
-          </a:bodyPr>
-          <a:lstStyle/>
-          <a:p>
-            <a:r>
-              <a:rPr lang="en-US" sz="1400" dirty="0" smtClean="0"/>
-              <a:t>Balance book</a:t>
-            </a:r>
-            <a:endParaRPr lang="en-US" sz="1400" dirty="0"/>
-          </a:p>
-        </p:txBody>
-      </p:sp>
-      <p:sp>
-        <p:nvSpPr>
-          <p:cNvPr id="102" name="Rectangle 101"/>
-          <p:cNvSpPr/>
-          <p:nvPr/>
-        </p:nvSpPr>
-        <p:spPr>
-          <a:xfrm>
-            <a:off x="2895600" y="685800"/>
-            <a:ext cx="2514600" cy="5791200"/>
-          </a:xfrm>
-          <a:prstGeom prst="rect">
-            <a:avLst/>
-          </a:prstGeom>
-        </p:spPr>
-        <p:style>
-          <a:lnRef idx="2">
-            <a:schemeClr val="accent1"/>
-          </a:lnRef>
-          <a:fillRef idx="1">
-            <a:schemeClr val="lt1"/>
-          </a:fillRef>
-          <a:effectRef idx="0">
-            <a:schemeClr val="accent1"/>
-          </a:effectRef>
-          <a:fontRef idx="minor">
-            <a:schemeClr val="dk1"/>
-          </a:fontRef>
-        </p:style>
-        <p:txBody>
-          <a:bodyPr rtlCol="0" anchor="ctr"/>
-          <a:lstStyle/>
-          <a:p>
-            <a:pPr algn="ctr"/>
-            <a:endParaRPr lang="en-US" dirty="0"/>
-          </a:p>
-        </p:txBody>
-      </p:sp>
-      <p:sp>
-        <p:nvSpPr>
-          <p:cNvPr id="103" name="Rectangle 102"/>
-          <p:cNvSpPr/>
-          <p:nvPr/>
-        </p:nvSpPr>
-        <p:spPr>
-          <a:xfrm>
-            <a:off x="5638800" y="685800"/>
-            <a:ext cx="3048000" cy="5791200"/>
-          </a:xfrm>
-          <a:prstGeom prst="rect">
-            <a:avLst/>
-          </a:prstGeom>
-        </p:spPr>
-        <p:style>
-          <a:lnRef idx="2">
-            <a:schemeClr val="accent1"/>
-          </a:lnRef>
-          <a:fillRef idx="1">
-            <a:schemeClr val="lt1"/>
-          </a:fillRef>
-          <a:effectRef idx="0">
-            <a:schemeClr val="accent1"/>
-          </a:effectRef>
-          <a:fontRef idx="minor">
-            <a:schemeClr val="dk1"/>
-          </a:fontRef>
-        </p:style>
-        <p:txBody>
-          <a:bodyPr rtlCol="0" anchor="ctr"/>
-          <a:lstStyle/>
-          <a:p>
-            <a:pPr algn="ctr"/>
-            <a:endParaRPr lang="en-US"/>
-          </a:p>
-        </p:txBody>
-      </p:sp>
-      <p:sp>
-        <p:nvSpPr>
           <p:cNvPr id="115" name="Rectangle 114"/>
           <p:cNvSpPr/>
           <p:nvPr/>
@@ -11095,314 +10851,6 @@
       </p:sp>
       <p:sp>
         <p:nvSpPr>
-          <p:cNvPr id="105" name="TextBox 104"/>
-          <p:cNvSpPr txBox="1"/>
-          <p:nvPr/>
-        </p:nvSpPr>
-        <p:spPr>
-          <a:xfrm>
-            <a:off x="2133600" y="685800"/>
-            <a:ext cx="838200" cy="246221"/>
-          </a:xfrm>
-          <a:prstGeom prst="rect">
-            <a:avLst/>
-          </a:prstGeom>
-          <a:noFill/>
-        </p:spPr>
-        <p:txBody>
-          <a:bodyPr wrap="square" rtlCol="0">
-            <a:spAutoFit/>
-          </a:bodyPr>
-          <a:lstStyle/>
-          <a:p>
-            <a:r>
-              <a:rPr lang="en-US" sz="1000" dirty="0" smtClean="0"/>
-              <a:t>10/01/2015</a:t>
-            </a:r>
-            <a:endParaRPr lang="en-US" sz="1000" dirty="0"/>
-          </a:p>
-        </p:txBody>
-      </p:sp>
-      <p:sp>
-        <p:nvSpPr>
-          <p:cNvPr id="106" name="TextBox 105"/>
-          <p:cNvSpPr txBox="1"/>
-          <p:nvPr/>
-        </p:nvSpPr>
-        <p:spPr>
-          <a:xfrm>
-            <a:off x="2895600" y="685800"/>
-            <a:ext cx="1295400" cy="246221"/>
-          </a:xfrm>
-          <a:prstGeom prst="rect">
-            <a:avLst/>
-          </a:prstGeom>
-          <a:noFill/>
-        </p:spPr>
-        <p:txBody>
-          <a:bodyPr wrap="square" rtlCol="0">
-            <a:spAutoFit/>
-          </a:bodyPr>
-          <a:lstStyle/>
-          <a:p>
-            <a:r>
-              <a:rPr lang="en-US" sz="1000" dirty="0" smtClean="0"/>
-              <a:t>Deposit</a:t>
-            </a:r>
-            <a:endParaRPr lang="en-US" sz="1000" dirty="0"/>
-          </a:p>
-        </p:txBody>
-      </p:sp>
-      <p:sp>
-        <p:nvSpPr>
-          <p:cNvPr id="107" name="TextBox 106"/>
-          <p:cNvSpPr txBox="1"/>
-          <p:nvPr/>
-        </p:nvSpPr>
-        <p:spPr>
-          <a:xfrm>
-            <a:off x="4495800" y="685800"/>
-            <a:ext cx="914400" cy="246221"/>
-          </a:xfrm>
-          <a:prstGeom prst="rect">
-            <a:avLst/>
-          </a:prstGeom>
-          <a:noFill/>
-        </p:spPr>
-        <p:txBody>
-          <a:bodyPr wrap="square" rtlCol="0">
-            <a:spAutoFit/>
-          </a:bodyPr>
-          <a:lstStyle/>
-          <a:p>
-            <a:pPr algn="r"/>
-            <a:r>
-              <a:rPr lang="en-US" sz="1000" dirty="0" smtClean="0"/>
-              <a:t>$200,000.00</a:t>
-            </a:r>
-            <a:endParaRPr lang="en-US" sz="1000" dirty="0"/>
-          </a:p>
-        </p:txBody>
-      </p:sp>
-      <p:sp>
-        <p:nvSpPr>
-          <p:cNvPr id="108" name="TextBox 107"/>
-          <p:cNvSpPr txBox="1"/>
-          <p:nvPr/>
-        </p:nvSpPr>
-        <p:spPr>
-          <a:xfrm>
-            <a:off x="2133600" y="914400"/>
-            <a:ext cx="838200" cy="246221"/>
-          </a:xfrm>
-          <a:prstGeom prst="rect">
-            <a:avLst/>
-          </a:prstGeom>
-          <a:noFill/>
-        </p:spPr>
-        <p:txBody>
-          <a:bodyPr wrap="square" rtlCol="0">
-            <a:spAutoFit/>
-          </a:bodyPr>
-          <a:lstStyle/>
-          <a:p>
-            <a:r>
-              <a:rPr lang="en-US" sz="1000" dirty="0" smtClean="0"/>
-              <a:t>12/01/2015</a:t>
-            </a:r>
-            <a:endParaRPr lang="en-US" sz="1000" dirty="0"/>
-          </a:p>
-        </p:txBody>
-      </p:sp>
-      <p:sp>
-        <p:nvSpPr>
-          <p:cNvPr id="109" name="TextBox 108"/>
-          <p:cNvSpPr txBox="1"/>
-          <p:nvPr/>
-        </p:nvSpPr>
-        <p:spPr>
-          <a:xfrm>
-            <a:off x="2895600" y="914400"/>
-            <a:ext cx="1295400" cy="246221"/>
-          </a:xfrm>
-          <a:prstGeom prst="rect">
-            <a:avLst/>
-          </a:prstGeom>
-          <a:noFill/>
-        </p:spPr>
-        <p:txBody>
-          <a:bodyPr wrap="square" rtlCol="0">
-            <a:spAutoFit/>
-          </a:bodyPr>
-          <a:lstStyle/>
-          <a:p>
-            <a:r>
-              <a:rPr lang="en-US" sz="1000" dirty="0" smtClean="0"/>
-              <a:t>MSFT purchase</a:t>
-            </a:r>
-            <a:endParaRPr lang="en-US" sz="1000" dirty="0"/>
-          </a:p>
-        </p:txBody>
-      </p:sp>
-      <p:sp>
-        <p:nvSpPr>
-          <p:cNvPr id="110" name="TextBox 109"/>
-          <p:cNvSpPr txBox="1"/>
-          <p:nvPr/>
-        </p:nvSpPr>
-        <p:spPr>
-          <a:xfrm>
-            <a:off x="4495800" y="914400"/>
-            <a:ext cx="914400" cy="246221"/>
-          </a:xfrm>
-          <a:prstGeom prst="rect">
-            <a:avLst/>
-          </a:prstGeom>
-          <a:noFill/>
-        </p:spPr>
-        <p:txBody>
-          <a:bodyPr wrap="square" rtlCol="0">
-            <a:spAutoFit/>
-          </a:bodyPr>
-          <a:lstStyle/>
-          <a:p>
-            <a:pPr algn="r"/>
-            <a:r>
-              <a:rPr lang="en-US" sz="1000" dirty="0" smtClean="0">
-                <a:solidFill>
-                  <a:srgbClr val="FF0000"/>
-                </a:solidFill>
-              </a:rPr>
-              <a:t>-$17,898.95</a:t>
-            </a:r>
-          </a:p>
-        </p:txBody>
-      </p:sp>
-      <p:sp>
-        <p:nvSpPr>
-          <p:cNvPr id="111" name="TextBox 110"/>
-          <p:cNvSpPr txBox="1"/>
-          <p:nvPr/>
-        </p:nvSpPr>
-        <p:spPr>
-          <a:xfrm>
-            <a:off x="6134100" y="914400"/>
-            <a:ext cx="609600" cy="246221"/>
-          </a:xfrm>
-          <a:prstGeom prst="rect">
-            <a:avLst/>
-          </a:prstGeom>
-          <a:noFill/>
-        </p:spPr>
-        <p:txBody>
-          <a:bodyPr wrap="square" rtlCol="0">
-            <a:spAutoFit/>
-          </a:bodyPr>
-          <a:lstStyle/>
-          <a:p>
-            <a:r>
-              <a:rPr lang="en-US" sz="1000" dirty="0" smtClean="0"/>
-              <a:t>MSFT</a:t>
-            </a:r>
-            <a:endParaRPr lang="en-US" sz="1000" dirty="0"/>
-          </a:p>
-        </p:txBody>
-      </p:sp>
-      <p:sp>
-        <p:nvSpPr>
-          <p:cNvPr id="112" name="TextBox 111"/>
-          <p:cNvSpPr txBox="1"/>
-          <p:nvPr/>
-        </p:nvSpPr>
-        <p:spPr>
-          <a:xfrm>
-            <a:off x="7772400" y="914400"/>
-            <a:ext cx="914400" cy="246221"/>
-          </a:xfrm>
-          <a:prstGeom prst="rect">
-            <a:avLst/>
-          </a:prstGeom>
-          <a:noFill/>
-        </p:spPr>
-        <p:txBody>
-          <a:bodyPr wrap="square" rtlCol="0">
-            <a:spAutoFit/>
-          </a:bodyPr>
-          <a:lstStyle/>
-          <a:p>
-            <a:pPr algn="r"/>
-            <a:r>
-              <a:rPr lang="en-US" sz="1000" dirty="0" smtClean="0"/>
-              <a:t>$17,898.95</a:t>
-            </a:r>
-            <a:endParaRPr lang="en-US" sz="1000" dirty="0"/>
-          </a:p>
-        </p:txBody>
-      </p:sp>
-      <p:sp>
-        <p:nvSpPr>
-          <p:cNvPr id="113" name="TextBox 112"/>
-          <p:cNvSpPr txBox="1"/>
-          <p:nvPr/>
-        </p:nvSpPr>
-        <p:spPr>
-          <a:xfrm>
-            <a:off x="6667500" y="914400"/>
-            <a:ext cx="533400" cy="246221"/>
-          </a:xfrm>
-          <a:prstGeom prst="rect">
-            <a:avLst/>
-          </a:prstGeom>
-          <a:noFill/>
-        </p:spPr>
-        <p:txBody>
-          <a:bodyPr wrap="square" rtlCol="0">
-            <a:spAutoFit/>
-          </a:bodyPr>
-          <a:lstStyle/>
-          <a:p>
-            <a:pPr algn="r"/>
-            <a:r>
-              <a:rPr lang="en-US" sz="1000" dirty="0" smtClean="0"/>
-              <a:t>300</a:t>
-            </a:r>
-            <a:endParaRPr lang="en-US" sz="1000" dirty="0"/>
-          </a:p>
-        </p:txBody>
-      </p:sp>
-      <p:sp>
-        <p:nvSpPr>
-          <p:cNvPr id="114" name="TextBox 113"/>
-          <p:cNvSpPr txBox="1"/>
-          <p:nvPr/>
-        </p:nvSpPr>
-        <p:spPr>
-          <a:xfrm>
-            <a:off x="7200900" y="914400"/>
-            <a:ext cx="685800" cy="246221"/>
-          </a:xfrm>
-          <a:prstGeom prst="rect">
-            <a:avLst/>
-          </a:prstGeom>
-          <a:noFill/>
-        </p:spPr>
-        <p:txBody>
-          <a:bodyPr wrap="square" rtlCol="0">
-            <a:spAutoFit/>
-          </a:bodyPr>
-          <a:lstStyle/>
-          <a:p>
-            <a:pPr algn="r"/>
-            <a:r>
-              <a:rPr lang="en-US" sz="1000" dirty="0" smtClean="0"/>
-              <a:t>$59.63</a:t>
-            </a:r>
-            <a:endParaRPr lang="en-US" sz="1000" dirty="0"/>
-          </a:p>
-        </p:txBody>
-      </p:sp>
-      <p:sp>
-        <p:nvSpPr>
           <p:cNvPr id="116" name="Rectangle 115"/>
           <p:cNvSpPr/>
           <p:nvPr/>
@@ -11590,6 +11038,896 @@
           <a:p>
             <a:pPr algn="ctr"/>
             <a:endParaRPr lang="en-US"/>
+          </a:p>
+        </p:txBody>
+      </p:sp>
+      <p:sp>
+        <p:nvSpPr>
+          <p:cNvPr id="65" name="Rectangle 64"/>
+          <p:cNvSpPr/>
+          <p:nvPr/>
+        </p:nvSpPr>
+        <p:spPr>
+          <a:xfrm>
+            <a:off x="2895600" y="3200400"/>
+            <a:ext cx="5791200" cy="228600"/>
+          </a:xfrm>
+          <a:prstGeom prst="rect">
+            <a:avLst/>
+          </a:prstGeom>
+          <a:solidFill>
+            <a:srgbClr val="C6D9F1">
+              <a:alpha val="30196"/>
+            </a:srgbClr>
+          </a:solidFill>
+          <a:ln>
+            <a:noFill/>
+          </a:ln>
+        </p:spPr>
+        <p:style>
+          <a:lnRef idx="2">
+            <a:schemeClr val="accent1">
+              <a:shade val="50000"/>
+            </a:schemeClr>
+          </a:lnRef>
+          <a:fillRef idx="1">
+            <a:schemeClr val="accent1"/>
+          </a:fillRef>
+          <a:effectRef idx="0">
+            <a:schemeClr val="accent1"/>
+          </a:effectRef>
+          <a:fontRef idx="minor">
+            <a:schemeClr val="lt1"/>
+          </a:fontRef>
+        </p:style>
+        <p:txBody>
+          <a:bodyPr rtlCol="0" anchor="ctr"/>
+          <a:lstStyle/>
+          <a:p>
+            <a:pPr algn="ctr"/>
+            <a:endParaRPr lang="en-US"/>
+          </a:p>
+        </p:txBody>
+      </p:sp>
+      <p:sp>
+        <p:nvSpPr>
+          <p:cNvPr id="66" name="Rectangle 65"/>
+          <p:cNvSpPr/>
+          <p:nvPr/>
+        </p:nvSpPr>
+        <p:spPr>
+          <a:xfrm>
+            <a:off x="2895600" y="3657600"/>
+            <a:ext cx="5791200" cy="228600"/>
+          </a:xfrm>
+          <a:prstGeom prst="rect">
+            <a:avLst/>
+          </a:prstGeom>
+          <a:solidFill>
+            <a:srgbClr val="C6D9F1">
+              <a:alpha val="30196"/>
+            </a:srgbClr>
+          </a:solidFill>
+          <a:ln>
+            <a:noFill/>
+          </a:ln>
+        </p:spPr>
+        <p:style>
+          <a:lnRef idx="2">
+            <a:schemeClr val="accent1">
+              <a:shade val="50000"/>
+            </a:schemeClr>
+          </a:lnRef>
+          <a:fillRef idx="1">
+            <a:schemeClr val="accent1"/>
+          </a:fillRef>
+          <a:effectRef idx="0">
+            <a:schemeClr val="accent1"/>
+          </a:effectRef>
+          <a:fontRef idx="minor">
+            <a:schemeClr val="lt1"/>
+          </a:fontRef>
+        </p:style>
+        <p:txBody>
+          <a:bodyPr rtlCol="0" anchor="ctr"/>
+          <a:lstStyle/>
+          <a:p>
+            <a:pPr algn="ctr"/>
+            <a:endParaRPr lang="en-US"/>
+          </a:p>
+        </p:txBody>
+      </p:sp>
+      <p:sp>
+        <p:nvSpPr>
+          <p:cNvPr id="80" name="Rectangle 79"/>
+          <p:cNvSpPr/>
+          <p:nvPr/>
+        </p:nvSpPr>
+        <p:spPr>
+          <a:xfrm>
+            <a:off x="2895600" y="4114800"/>
+            <a:ext cx="5791200" cy="228600"/>
+          </a:xfrm>
+          <a:prstGeom prst="rect">
+            <a:avLst/>
+          </a:prstGeom>
+          <a:solidFill>
+            <a:srgbClr val="C6D9F1">
+              <a:alpha val="30196"/>
+            </a:srgbClr>
+          </a:solidFill>
+          <a:ln>
+            <a:noFill/>
+          </a:ln>
+        </p:spPr>
+        <p:style>
+          <a:lnRef idx="2">
+            <a:schemeClr val="accent1">
+              <a:shade val="50000"/>
+            </a:schemeClr>
+          </a:lnRef>
+          <a:fillRef idx="1">
+            <a:schemeClr val="accent1"/>
+          </a:fillRef>
+          <a:effectRef idx="0">
+            <a:schemeClr val="accent1"/>
+          </a:effectRef>
+          <a:fontRef idx="minor">
+            <a:schemeClr val="lt1"/>
+          </a:fontRef>
+        </p:style>
+        <p:txBody>
+          <a:bodyPr rtlCol="0" anchor="ctr"/>
+          <a:lstStyle/>
+          <a:p>
+            <a:pPr algn="ctr"/>
+            <a:endParaRPr lang="en-US"/>
+          </a:p>
+        </p:txBody>
+      </p:sp>
+      <p:sp>
+        <p:nvSpPr>
+          <p:cNvPr id="81" name="Rectangle 80"/>
+          <p:cNvSpPr/>
+          <p:nvPr/>
+        </p:nvSpPr>
+        <p:spPr>
+          <a:xfrm>
+            <a:off x="2895600" y="4572000"/>
+            <a:ext cx="5791200" cy="228600"/>
+          </a:xfrm>
+          <a:prstGeom prst="rect">
+            <a:avLst/>
+          </a:prstGeom>
+          <a:solidFill>
+            <a:srgbClr val="C6D9F1">
+              <a:alpha val="30196"/>
+            </a:srgbClr>
+          </a:solidFill>
+          <a:ln>
+            <a:noFill/>
+          </a:ln>
+        </p:spPr>
+        <p:style>
+          <a:lnRef idx="2">
+            <a:schemeClr val="accent1">
+              <a:shade val="50000"/>
+            </a:schemeClr>
+          </a:lnRef>
+          <a:fillRef idx="1">
+            <a:schemeClr val="accent1"/>
+          </a:fillRef>
+          <a:effectRef idx="0">
+            <a:schemeClr val="accent1"/>
+          </a:effectRef>
+          <a:fontRef idx="minor">
+            <a:schemeClr val="lt1"/>
+          </a:fontRef>
+        </p:style>
+        <p:txBody>
+          <a:bodyPr rtlCol="0" anchor="ctr"/>
+          <a:lstStyle/>
+          <a:p>
+            <a:pPr algn="ctr"/>
+            <a:endParaRPr lang="en-US"/>
+          </a:p>
+        </p:txBody>
+      </p:sp>
+      <p:sp>
+        <p:nvSpPr>
+          <p:cNvPr id="82" name="Rectangle 81"/>
+          <p:cNvSpPr/>
+          <p:nvPr/>
+        </p:nvSpPr>
+        <p:spPr>
+          <a:xfrm>
+            <a:off x="2895600" y="5029200"/>
+            <a:ext cx="5791200" cy="228600"/>
+          </a:xfrm>
+          <a:prstGeom prst="rect">
+            <a:avLst/>
+          </a:prstGeom>
+          <a:solidFill>
+            <a:srgbClr val="C6D9F1">
+              <a:alpha val="30196"/>
+            </a:srgbClr>
+          </a:solidFill>
+          <a:ln>
+            <a:noFill/>
+          </a:ln>
+        </p:spPr>
+        <p:style>
+          <a:lnRef idx="2">
+            <a:schemeClr val="accent1">
+              <a:shade val="50000"/>
+            </a:schemeClr>
+          </a:lnRef>
+          <a:fillRef idx="1">
+            <a:schemeClr val="accent1"/>
+          </a:fillRef>
+          <a:effectRef idx="0">
+            <a:schemeClr val="accent1"/>
+          </a:effectRef>
+          <a:fontRef idx="minor">
+            <a:schemeClr val="lt1"/>
+          </a:fontRef>
+        </p:style>
+        <p:txBody>
+          <a:bodyPr rtlCol="0" anchor="ctr"/>
+          <a:lstStyle/>
+          <a:p>
+            <a:pPr algn="ctr"/>
+            <a:endParaRPr lang="en-US"/>
+          </a:p>
+        </p:txBody>
+      </p:sp>
+      <p:sp>
+        <p:nvSpPr>
+          <p:cNvPr id="83" name="Rectangle 82"/>
+          <p:cNvSpPr/>
+          <p:nvPr/>
+        </p:nvSpPr>
+        <p:spPr>
+          <a:xfrm>
+            <a:off x="2895600" y="5486400"/>
+            <a:ext cx="5791200" cy="228600"/>
+          </a:xfrm>
+          <a:prstGeom prst="rect">
+            <a:avLst/>
+          </a:prstGeom>
+          <a:solidFill>
+            <a:srgbClr val="C6D9F1">
+              <a:alpha val="30196"/>
+            </a:srgbClr>
+          </a:solidFill>
+          <a:ln>
+            <a:noFill/>
+          </a:ln>
+        </p:spPr>
+        <p:style>
+          <a:lnRef idx="2">
+            <a:schemeClr val="accent1">
+              <a:shade val="50000"/>
+            </a:schemeClr>
+          </a:lnRef>
+          <a:fillRef idx="1">
+            <a:schemeClr val="accent1"/>
+          </a:fillRef>
+          <a:effectRef idx="0">
+            <a:schemeClr val="accent1"/>
+          </a:effectRef>
+          <a:fontRef idx="minor">
+            <a:schemeClr val="lt1"/>
+          </a:fontRef>
+        </p:style>
+        <p:txBody>
+          <a:bodyPr rtlCol="0" anchor="ctr"/>
+          <a:lstStyle/>
+          <a:p>
+            <a:pPr algn="ctr"/>
+            <a:endParaRPr lang="en-US"/>
+          </a:p>
+        </p:txBody>
+      </p:sp>
+      <p:sp>
+        <p:nvSpPr>
+          <p:cNvPr id="84" name="Rectangle 83"/>
+          <p:cNvSpPr/>
+          <p:nvPr/>
+        </p:nvSpPr>
+        <p:spPr>
+          <a:xfrm>
+            <a:off x="2895600" y="5943600"/>
+            <a:ext cx="5791200" cy="228600"/>
+          </a:xfrm>
+          <a:prstGeom prst="rect">
+            <a:avLst/>
+          </a:prstGeom>
+          <a:solidFill>
+            <a:srgbClr val="C6D9F1">
+              <a:alpha val="30196"/>
+            </a:srgbClr>
+          </a:solidFill>
+          <a:ln>
+            <a:noFill/>
+          </a:ln>
+        </p:spPr>
+        <p:style>
+          <a:lnRef idx="2">
+            <a:schemeClr val="accent1">
+              <a:shade val="50000"/>
+            </a:schemeClr>
+          </a:lnRef>
+          <a:fillRef idx="1">
+            <a:schemeClr val="accent1"/>
+          </a:fillRef>
+          <a:effectRef idx="0">
+            <a:schemeClr val="accent1"/>
+          </a:effectRef>
+          <a:fontRef idx="minor">
+            <a:schemeClr val="lt1"/>
+          </a:fontRef>
+        </p:style>
+        <p:txBody>
+          <a:bodyPr rtlCol="0" anchor="ctr"/>
+          <a:lstStyle/>
+          <a:p>
+            <a:pPr algn="ctr"/>
+            <a:endParaRPr lang="en-US"/>
+          </a:p>
+        </p:txBody>
+      </p:sp>
+      <p:sp>
+        <p:nvSpPr>
+          <p:cNvPr id="78" name="Rectangle 77"/>
+          <p:cNvSpPr/>
+          <p:nvPr/>
+        </p:nvSpPr>
+        <p:spPr>
+          <a:xfrm>
+            <a:off x="152400" y="685800"/>
+            <a:ext cx="1905000" cy="6019800"/>
+          </a:xfrm>
+          <a:prstGeom prst="rect">
+            <a:avLst/>
+          </a:prstGeom>
+        </p:spPr>
+        <p:style>
+          <a:lnRef idx="2">
+            <a:schemeClr val="accent1">
+              <a:shade val="50000"/>
+            </a:schemeClr>
+          </a:lnRef>
+          <a:fillRef idx="1">
+            <a:schemeClr val="accent1"/>
+          </a:fillRef>
+          <a:effectRef idx="0">
+            <a:schemeClr val="accent1"/>
+          </a:effectRef>
+          <a:fontRef idx="minor">
+            <a:schemeClr val="lt1"/>
+          </a:fontRef>
+        </p:style>
+        <p:txBody>
+          <a:bodyPr rtlCol="0" anchor="ctr"/>
+          <a:lstStyle/>
+          <a:p>
+            <a:pPr algn="ctr"/>
+            <a:endParaRPr lang="en-US"/>
+          </a:p>
+        </p:txBody>
+      </p:sp>
+      <p:sp>
+        <p:nvSpPr>
+          <p:cNvPr id="6" name="Rectangle 5"/>
+          <p:cNvSpPr/>
+          <p:nvPr/>
+        </p:nvSpPr>
+        <p:spPr>
+          <a:xfrm>
+            <a:off x="152400" y="152400"/>
+            <a:ext cx="1905000" cy="457200"/>
+          </a:xfrm>
+          <a:prstGeom prst="rect">
+            <a:avLst/>
+          </a:prstGeom>
+          <a:solidFill>
+            <a:schemeClr val="bg1">
+              <a:lumMod val="95000"/>
+            </a:schemeClr>
+          </a:solidFill>
+          <a:ln w="19050"/>
+        </p:spPr>
+        <p:style>
+          <a:lnRef idx="2">
+            <a:schemeClr val="accent1"/>
+          </a:lnRef>
+          <a:fillRef idx="1">
+            <a:schemeClr val="lt1"/>
+          </a:fillRef>
+          <a:effectRef idx="0">
+            <a:schemeClr val="accent1"/>
+          </a:effectRef>
+          <a:fontRef idx="minor">
+            <a:schemeClr val="dk1"/>
+          </a:fontRef>
+        </p:style>
+        <p:txBody>
+          <a:bodyPr rtlCol="0" anchor="ctr"/>
+          <a:lstStyle/>
+          <a:p>
+            <a:pPr algn="ctr"/>
+            <a:r>
+              <a:rPr lang="en-US" sz="1200" dirty="0" smtClean="0"/>
+              <a:t>Max’s Portfolio</a:t>
+            </a:r>
+            <a:endParaRPr lang="en-US" sz="1200" dirty="0"/>
+          </a:p>
+        </p:txBody>
+      </p:sp>
+      <p:sp>
+        <p:nvSpPr>
+          <p:cNvPr id="91" name="Rectangle 90"/>
+          <p:cNvSpPr/>
+          <p:nvPr/>
+        </p:nvSpPr>
+        <p:spPr>
+          <a:xfrm>
+            <a:off x="2133600" y="152400"/>
+            <a:ext cx="6858000" cy="457200"/>
+          </a:xfrm>
+          <a:prstGeom prst="rect">
+            <a:avLst/>
+          </a:prstGeom>
+          <a:solidFill>
+            <a:schemeClr val="bg1">
+              <a:lumMod val="95000"/>
+            </a:schemeClr>
+          </a:solidFill>
+          <a:ln w="19050"/>
+        </p:spPr>
+        <p:style>
+          <a:lnRef idx="2">
+            <a:schemeClr val="accent1"/>
+          </a:lnRef>
+          <a:fillRef idx="1">
+            <a:schemeClr val="lt1"/>
+          </a:fillRef>
+          <a:effectRef idx="0">
+            <a:schemeClr val="accent1"/>
+          </a:effectRef>
+          <a:fontRef idx="minor">
+            <a:schemeClr val="dk1"/>
+          </a:fontRef>
+        </p:style>
+        <p:txBody>
+          <a:bodyPr rtlCol="0" anchor="ctr"/>
+          <a:lstStyle/>
+          <a:p>
+            <a:pPr algn="ctr"/>
+            <a:r>
+              <a:rPr lang="en-US" sz="2400" dirty="0" smtClean="0"/>
+              <a:t>RBC RESP DI</a:t>
+            </a:r>
+            <a:endParaRPr lang="en-US" sz="2400" dirty="0"/>
+          </a:p>
+        </p:txBody>
+      </p:sp>
+      <p:sp>
+        <p:nvSpPr>
+          <p:cNvPr id="92" name="TextBox 91"/>
+          <p:cNvSpPr txBox="1"/>
+          <p:nvPr/>
+        </p:nvSpPr>
+        <p:spPr>
+          <a:xfrm>
+            <a:off x="152400" y="685800"/>
+            <a:ext cx="1905000" cy="307777"/>
+          </a:xfrm>
+          <a:prstGeom prst="rect">
+            <a:avLst/>
+          </a:prstGeom>
+          <a:solidFill>
+            <a:schemeClr val="bg1"/>
+          </a:solidFill>
+        </p:spPr>
+        <p:txBody>
+          <a:bodyPr wrap="square" rtlCol="0">
+            <a:spAutoFit/>
+          </a:bodyPr>
+          <a:lstStyle/>
+          <a:p>
+            <a:r>
+              <a:rPr lang="en-US" sz="1400" dirty="0" smtClean="0"/>
+              <a:t>Balance book</a:t>
+            </a:r>
+            <a:endParaRPr lang="en-US" sz="1400" dirty="0"/>
+          </a:p>
+        </p:txBody>
+      </p:sp>
+      <p:sp>
+        <p:nvSpPr>
+          <p:cNvPr id="102" name="Rectangle 101"/>
+          <p:cNvSpPr/>
+          <p:nvPr/>
+        </p:nvSpPr>
+        <p:spPr>
+          <a:xfrm>
+            <a:off x="2895600" y="685800"/>
+            <a:ext cx="2514600" cy="5791200"/>
+          </a:xfrm>
+          <a:prstGeom prst="rect">
+            <a:avLst/>
+          </a:prstGeom>
+          <a:noFill/>
+        </p:spPr>
+        <p:style>
+          <a:lnRef idx="2">
+            <a:schemeClr val="accent1"/>
+          </a:lnRef>
+          <a:fillRef idx="1">
+            <a:schemeClr val="lt1"/>
+          </a:fillRef>
+          <a:effectRef idx="0">
+            <a:schemeClr val="accent1"/>
+          </a:effectRef>
+          <a:fontRef idx="minor">
+            <a:schemeClr val="dk1"/>
+          </a:fontRef>
+        </p:style>
+        <p:txBody>
+          <a:bodyPr rtlCol="0" anchor="ctr"/>
+          <a:lstStyle/>
+          <a:p>
+            <a:pPr algn="ctr"/>
+            <a:endParaRPr lang="en-US" dirty="0"/>
+          </a:p>
+        </p:txBody>
+      </p:sp>
+      <p:sp>
+        <p:nvSpPr>
+          <p:cNvPr id="103" name="Rectangle 102"/>
+          <p:cNvSpPr/>
+          <p:nvPr/>
+        </p:nvSpPr>
+        <p:spPr>
+          <a:xfrm>
+            <a:off x="5638800" y="685800"/>
+            <a:ext cx="3048000" cy="5791200"/>
+          </a:xfrm>
+          <a:prstGeom prst="rect">
+            <a:avLst/>
+          </a:prstGeom>
+          <a:noFill/>
+        </p:spPr>
+        <p:style>
+          <a:lnRef idx="2">
+            <a:schemeClr val="accent1"/>
+          </a:lnRef>
+          <a:fillRef idx="1">
+            <a:schemeClr val="lt1"/>
+          </a:fillRef>
+          <a:effectRef idx="0">
+            <a:schemeClr val="accent1"/>
+          </a:effectRef>
+          <a:fontRef idx="minor">
+            <a:schemeClr val="dk1"/>
+          </a:fontRef>
+        </p:style>
+        <p:txBody>
+          <a:bodyPr rtlCol="0" anchor="ctr"/>
+          <a:lstStyle/>
+          <a:p>
+            <a:pPr algn="ctr"/>
+            <a:endParaRPr lang="en-US"/>
+          </a:p>
+        </p:txBody>
+      </p:sp>
+      <p:sp>
+        <p:nvSpPr>
+          <p:cNvPr id="105" name="TextBox 104"/>
+          <p:cNvSpPr txBox="1"/>
+          <p:nvPr/>
+        </p:nvSpPr>
+        <p:spPr>
+          <a:xfrm>
+            <a:off x="2133600" y="685800"/>
+            <a:ext cx="838200" cy="246221"/>
+          </a:xfrm>
+          <a:prstGeom prst="rect">
+            <a:avLst/>
+          </a:prstGeom>
+          <a:noFill/>
+        </p:spPr>
+        <p:txBody>
+          <a:bodyPr wrap="square" rtlCol="0">
+            <a:spAutoFit/>
+          </a:bodyPr>
+          <a:lstStyle/>
+          <a:p>
+            <a:r>
+              <a:rPr lang="en-US" sz="1000" dirty="0" smtClean="0"/>
+              <a:t>10/01/2015</a:t>
+            </a:r>
+            <a:endParaRPr lang="en-US" sz="1000" dirty="0"/>
+          </a:p>
+        </p:txBody>
+      </p:sp>
+      <p:sp>
+        <p:nvSpPr>
+          <p:cNvPr id="106" name="TextBox 105"/>
+          <p:cNvSpPr txBox="1"/>
+          <p:nvPr/>
+        </p:nvSpPr>
+        <p:spPr>
+          <a:xfrm>
+            <a:off x="2895600" y="685800"/>
+            <a:ext cx="1295400" cy="246221"/>
+          </a:xfrm>
+          <a:prstGeom prst="rect">
+            <a:avLst/>
+          </a:prstGeom>
+          <a:noFill/>
+        </p:spPr>
+        <p:txBody>
+          <a:bodyPr wrap="square" rtlCol="0">
+            <a:spAutoFit/>
+          </a:bodyPr>
+          <a:lstStyle/>
+          <a:p>
+            <a:r>
+              <a:rPr lang="en-US" sz="1000" dirty="0" smtClean="0"/>
+              <a:t>Deposit</a:t>
+            </a:r>
+            <a:endParaRPr lang="en-US" sz="1000" dirty="0"/>
+          </a:p>
+        </p:txBody>
+      </p:sp>
+      <p:sp>
+        <p:nvSpPr>
+          <p:cNvPr id="107" name="TextBox 106"/>
+          <p:cNvSpPr txBox="1"/>
+          <p:nvPr/>
+        </p:nvSpPr>
+        <p:spPr>
+          <a:xfrm>
+            <a:off x="4495800" y="685800"/>
+            <a:ext cx="914400" cy="246221"/>
+          </a:xfrm>
+          <a:prstGeom prst="rect">
+            <a:avLst/>
+          </a:prstGeom>
+          <a:noFill/>
+        </p:spPr>
+        <p:txBody>
+          <a:bodyPr wrap="square" rtlCol="0">
+            <a:spAutoFit/>
+          </a:bodyPr>
+          <a:lstStyle/>
+          <a:p>
+            <a:pPr algn="r"/>
+            <a:r>
+              <a:rPr lang="en-US" sz="1000" dirty="0" smtClean="0"/>
+              <a:t>$200,000.00</a:t>
+            </a:r>
+            <a:endParaRPr lang="en-US" sz="1000" dirty="0"/>
+          </a:p>
+        </p:txBody>
+      </p:sp>
+      <p:sp>
+        <p:nvSpPr>
+          <p:cNvPr id="108" name="TextBox 107"/>
+          <p:cNvSpPr txBox="1"/>
+          <p:nvPr/>
+        </p:nvSpPr>
+        <p:spPr>
+          <a:xfrm>
+            <a:off x="2133600" y="914400"/>
+            <a:ext cx="838200" cy="246221"/>
+          </a:xfrm>
+          <a:prstGeom prst="rect">
+            <a:avLst/>
+          </a:prstGeom>
+          <a:noFill/>
+        </p:spPr>
+        <p:txBody>
+          <a:bodyPr wrap="square" rtlCol="0">
+            <a:spAutoFit/>
+          </a:bodyPr>
+          <a:lstStyle/>
+          <a:p>
+            <a:r>
+              <a:rPr lang="en-US" sz="1000" dirty="0" smtClean="0"/>
+              <a:t>12/01/2015</a:t>
+            </a:r>
+            <a:endParaRPr lang="en-US" sz="1000" dirty="0"/>
+          </a:p>
+        </p:txBody>
+      </p:sp>
+      <p:sp>
+        <p:nvSpPr>
+          <p:cNvPr id="109" name="TextBox 108"/>
+          <p:cNvSpPr txBox="1"/>
+          <p:nvPr/>
+        </p:nvSpPr>
+        <p:spPr>
+          <a:xfrm>
+            <a:off x="2895600" y="914400"/>
+            <a:ext cx="1295400" cy="246221"/>
+          </a:xfrm>
+          <a:prstGeom prst="rect">
+            <a:avLst/>
+          </a:prstGeom>
+          <a:noFill/>
+        </p:spPr>
+        <p:txBody>
+          <a:bodyPr wrap="square" rtlCol="0">
+            <a:spAutoFit/>
+          </a:bodyPr>
+          <a:lstStyle/>
+          <a:p>
+            <a:r>
+              <a:rPr lang="en-US" sz="1000" dirty="0" smtClean="0"/>
+              <a:t>MSFT purchase</a:t>
+            </a:r>
+            <a:endParaRPr lang="en-US" sz="1000" dirty="0"/>
+          </a:p>
+        </p:txBody>
+      </p:sp>
+      <p:sp>
+        <p:nvSpPr>
+          <p:cNvPr id="110" name="TextBox 109"/>
+          <p:cNvSpPr txBox="1"/>
+          <p:nvPr/>
+        </p:nvSpPr>
+        <p:spPr>
+          <a:xfrm>
+            <a:off x="4495800" y="914400"/>
+            <a:ext cx="914400" cy="246221"/>
+          </a:xfrm>
+          <a:prstGeom prst="rect">
+            <a:avLst/>
+          </a:prstGeom>
+          <a:noFill/>
+        </p:spPr>
+        <p:txBody>
+          <a:bodyPr wrap="square" rtlCol="0">
+            <a:spAutoFit/>
+          </a:bodyPr>
+          <a:lstStyle/>
+          <a:p>
+            <a:pPr algn="r"/>
+            <a:r>
+              <a:rPr lang="en-US" sz="1000" dirty="0" smtClean="0">
+                <a:solidFill>
+                  <a:srgbClr val="FF0000"/>
+                </a:solidFill>
+              </a:rPr>
+              <a:t>-$17,898.95</a:t>
+            </a:r>
+          </a:p>
+        </p:txBody>
+      </p:sp>
+      <p:sp>
+        <p:nvSpPr>
+          <p:cNvPr id="111" name="TextBox 110"/>
+          <p:cNvSpPr txBox="1"/>
+          <p:nvPr/>
+        </p:nvSpPr>
+        <p:spPr>
+          <a:xfrm>
+            <a:off x="6134100" y="914400"/>
+            <a:ext cx="609600" cy="246221"/>
+          </a:xfrm>
+          <a:prstGeom prst="rect">
+            <a:avLst/>
+          </a:prstGeom>
+          <a:noFill/>
+        </p:spPr>
+        <p:txBody>
+          <a:bodyPr wrap="square" rtlCol="0">
+            <a:spAutoFit/>
+          </a:bodyPr>
+          <a:lstStyle/>
+          <a:p>
+            <a:r>
+              <a:rPr lang="en-US" sz="1000" dirty="0" smtClean="0"/>
+              <a:t>MSFT</a:t>
+            </a:r>
+            <a:endParaRPr lang="en-US" sz="1000" dirty="0"/>
+          </a:p>
+        </p:txBody>
+      </p:sp>
+      <p:sp>
+        <p:nvSpPr>
+          <p:cNvPr id="112" name="TextBox 111"/>
+          <p:cNvSpPr txBox="1"/>
+          <p:nvPr/>
+        </p:nvSpPr>
+        <p:spPr>
+          <a:xfrm>
+            <a:off x="7772400" y="914400"/>
+            <a:ext cx="914400" cy="246221"/>
+          </a:xfrm>
+          <a:prstGeom prst="rect">
+            <a:avLst/>
+          </a:prstGeom>
+          <a:noFill/>
+        </p:spPr>
+        <p:txBody>
+          <a:bodyPr wrap="square" rtlCol="0">
+            <a:spAutoFit/>
+          </a:bodyPr>
+          <a:lstStyle/>
+          <a:p>
+            <a:pPr algn="r"/>
+            <a:r>
+              <a:rPr lang="en-US" sz="1000" dirty="0" smtClean="0"/>
+              <a:t>$17,898.95</a:t>
+            </a:r>
+            <a:endParaRPr lang="en-US" sz="1000" dirty="0"/>
+          </a:p>
+        </p:txBody>
+      </p:sp>
+      <p:sp>
+        <p:nvSpPr>
+          <p:cNvPr id="113" name="TextBox 112"/>
+          <p:cNvSpPr txBox="1"/>
+          <p:nvPr/>
+        </p:nvSpPr>
+        <p:spPr>
+          <a:xfrm>
+            <a:off x="6667500" y="914400"/>
+            <a:ext cx="533400" cy="246221"/>
+          </a:xfrm>
+          <a:prstGeom prst="rect">
+            <a:avLst/>
+          </a:prstGeom>
+          <a:noFill/>
+        </p:spPr>
+        <p:txBody>
+          <a:bodyPr wrap="square" rtlCol="0">
+            <a:spAutoFit/>
+          </a:bodyPr>
+          <a:lstStyle/>
+          <a:p>
+            <a:pPr algn="r"/>
+            <a:r>
+              <a:rPr lang="en-US" sz="1000" dirty="0" smtClean="0"/>
+              <a:t>300</a:t>
+            </a:r>
+            <a:endParaRPr lang="en-US" sz="1000" dirty="0"/>
+          </a:p>
+        </p:txBody>
+      </p:sp>
+      <p:sp>
+        <p:nvSpPr>
+          <p:cNvPr id="114" name="TextBox 113"/>
+          <p:cNvSpPr txBox="1"/>
+          <p:nvPr/>
+        </p:nvSpPr>
+        <p:spPr>
+          <a:xfrm>
+            <a:off x="7200900" y="914400"/>
+            <a:ext cx="685800" cy="246221"/>
+          </a:xfrm>
+          <a:prstGeom prst="rect">
+            <a:avLst/>
+          </a:prstGeom>
+          <a:noFill/>
+        </p:spPr>
+        <p:txBody>
+          <a:bodyPr wrap="square" rtlCol="0">
+            <a:spAutoFit/>
+          </a:bodyPr>
+          <a:lstStyle/>
+          <a:p>
+            <a:pPr algn="r"/>
+            <a:r>
+              <a:rPr lang="en-US" sz="1000" dirty="0" smtClean="0"/>
+              <a:t>$59.63</a:t>
+            </a:r>
+            <a:endParaRPr lang="en-US" sz="1000" dirty="0"/>
           </a:p>
         </p:txBody>
       </p:sp>
@@ -12910,342 +13248,6 @@
           </a:p>
         </p:txBody>
       </p:sp>
-      <p:sp>
-        <p:nvSpPr>
-          <p:cNvPr id="65" name="Rectangle 64"/>
-          <p:cNvSpPr/>
-          <p:nvPr/>
-        </p:nvSpPr>
-        <p:spPr>
-          <a:xfrm>
-            <a:off x="2895600" y="3200400"/>
-            <a:ext cx="5791200" cy="228600"/>
-          </a:xfrm>
-          <a:prstGeom prst="rect">
-            <a:avLst/>
-          </a:prstGeom>
-          <a:solidFill>
-            <a:srgbClr val="C6D9F1">
-              <a:alpha val="30196"/>
-            </a:srgbClr>
-          </a:solidFill>
-          <a:ln>
-            <a:noFill/>
-          </a:ln>
-        </p:spPr>
-        <p:style>
-          <a:lnRef idx="2">
-            <a:schemeClr val="accent1">
-              <a:shade val="50000"/>
-            </a:schemeClr>
-          </a:lnRef>
-          <a:fillRef idx="1">
-            <a:schemeClr val="accent1"/>
-          </a:fillRef>
-          <a:effectRef idx="0">
-            <a:schemeClr val="accent1"/>
-          </a:effectRef>
-          <a:fontRef idx="minor">
-            <a:schemeClr val="lt1"/>
-          </a:fontRef>
-        </p:style>
-        <p:txBody>
-          <a:bodyPr rtlCol="0" anchor="ctr"/>
-          <a:lstStyle/>
-          <a:p>
-            <a:pPr algn="ctr"/>
-            <a:endParaRPr lang="en-US"/>
-          </a:p>
-        </p:txBody>
-      </p:sp>
-      <p:sp>
-        <p:nvSpPr>
-          <p:cNvPr id="66" name="Rectangle 65"/>
-          <p:cNvSpPr/>
-          <p:nvPr/>
-        </p:nvSpPr>
-        <p:spPr>
-          <a:xfrm>
-            <a:off x="2895600" y="3657600"/>
-            <a:ext cx="5791200" cy="228600"/>
-          </a:xfrm>
-          <a:prstGeom prst="rect">
-            <a:avLst/>
-          </a:prstGeom>
-          <a:solidFill>
-            <a:srgbClr val="C6D9F1">
-              <a:alpha val="30196"/>
-            </a:srgbClr>
-          </a:solidFill>
-          <a:ln>
-            <a:noFill/>
-          </a:ln>
-        </p:spPr>
-        <p:style>
-          <a:lnRef idx="2">
-            <a:schemeClr val="accent1">
-              <a:shade val="50000"/>
-            </a:schemeClr>
-          </a:lnRef>
-          <a:fillRef idx="1">
-            <a:schemeClr val="accent1"/>
-          </a:fillRef>
-          <a:effectRef idx="0">
-            <a:schemeClr val="accent1"/>
-          </a:effectRef>
-          <a:fontRef idx="minor">
-            <a:schemeClr val="lt1"/>
-          </a:fontRef>
-        </p:style>
-        <p:txBody>
-          <a:bodyPr rtlCol="0" anchor="ctr"/>
-          <a:lstStyle/>
-          <a:p>
-            <a:pPr algn="ctr"/>
-            <a:endParaRPr lang="en-US"/>
-          </a:p>
-        </p:txBody>
-      </p:sp>
-      <p:sp>
-        <p:nvSpPr>
-          <p:cNvPr id="80" name="Rectangle 79"/>
-          <p:cNvSpPr/>
-          <p:nvPr/>
-        </p:nvSpPr>
-        <p:spPr>
-          <a:xfrm>
-            <a:off x="2895600" y="4114800"/>
-            <a:ext cx="5791200" cy="228600"/>
-          </a:xfrm>
-          <a:prstGeom prst="rect">
-            <a:avLst/>
-          </a:prstGeom>
-          <a:solidFill>
-            <a:srgbClr val="C6D9F1">
-              <a:alpha val="30196"/>
-            </a:srgbClr>
-          </a:solidFill>
-          <a:ln>
-            <a:noFill/>
-          </a:ln>
-        </p:spPr>
-        <p:style>
-          <a:lnRef idx="2">
-            <a:schemeClr val="accent1">
-              <a:shade val="50000"/>
-            </a:schemeClr>
-          </a:lnRef>
-          <a:fillRef idx="1">
-            <a:schemeClr val="accent1"/>
-          </a:fillRef>
-          <a:effectRef idx="0">
-            <a:schemeClr val="accent1"/>
-          </a:effectRef>
-          <a:fontRef idx="minor">
-            <a:schemeClr val="lt1"/>
-          </a:fontRef>
-        </p:style>
-        <p:txBody>
-          <a:bodyPr rtlCol="0" anchor="ctr"/>
-          <a:lstStyle/>
-          <a:p>
-            <a:pPr algn="ctr"/>
-            <a:endParaRPr lang="en-US"/>
-          </a:p>
-        </p:txBody>
-      </p:sp>
-      <p:sp>
-        <p:nvSpPr>
-          <p:cNvPr id="81" name="Rectangle 80"/>
-          <p:cNvSpPr/>
-          <p:nvPr/>
-        </p:nvSpPr>
-        <p:spPr>
-          <a:xfrm>
-            <a:off x="2895600" y="4572000"/>
-            <a:ext cx="5791200" cy="228600"/>
-          </a:xfrm>
-          <a:prstGeom prst="rect">
-            <a:avLst/>
-          </a:prstGeom>
-          <a:solidFill>
-            <a:srgbClr val="C6D9F1">
-              <a:alpha val="30196"/>
-            </a:srgbClr>
-          </a:solidFill>
-          <a:ln>
-            <a:noFill/>
-          </a:ln>
-        </p:spPr>
-        <p:style>
-          <a:lnRef idx="2">
-            <a:schemeClr val="accent1">
-              <a:shade val="50000"/>
-            </a:schemeClr>
-          </a:lnRef>
-          <a:fillRef idx="1">
-            <a:schemeClr val="accent1"/>
-          </a:fillRef>
-          <a:effectRef idx="0">
-            <a:schemeClr val="accent1"/>
-          </a:effectRef>
-          <a:fontRef idx="minor">
-            <a:schemeClr val="lt1"/>
-          </a:fontRef>
-        </p:style>
-        <p:txBody>
-          <a:bodyPr rtlCol="0" anchor="ctr"/>
-          <a:lstStyle/>
-          <a:p>
-            <a:pPr algn="ctr"/>
-            <a:endParaRPr lang="en-US"/>
-          </a:p>
-        </p:txBody>
-      </p:sp>
-      <p:sp>
-        <p:nvSpPr>
-          <p:cNvPr id="82" name="Rectangle 81"/>
-          <p:cNvSpPr/>
-          <p:nvPr/>
-        </p:nvSpPr>
-        <p:spPr>
-          <a:xfrm>
-            <a:off x="2895600" y="5029200"/>
-            <a:ext cx="5791200" cy="228600"/>
-          </a:xfrm>
-          <a:prstGeom prst="rect">
-            <a:avLst/>
-          </a:prstGeom>
-          <a:solidFill>
-            <a:srgbClr val="C6D9F1">
-              <a:alpha val="30196"/>
-            </a:srgbClr>
-          </a:solidFill>
-          <a:ln>
-            <a:noFill/>
-          </a:ln>
-        </p:spPr>
-        <p:style>
-          <a:lnRef idx="2">
-            <a:schemeClr val="accent1">
-              <a:shade val="50000"/>
-            </a:schemeClr>
-          </a:lnRef>
-          <a:fillRef idx="1">
-            <a:schemeClr val="accent1"/>
-          </a:fillRef>
-          <a:effectRef idx="0">
-            <a:schemeClr val="accent1"/>
-          </a:effectRef>
-          <a:fontRef idx="minor">
-            <a:schemeClr val="lt1"/>
-          </a:fontRef>
-        </p:style>
-        <p:txBody>
-          <a:bodyPr rtlCol="0" anchor="ctr"/>
-          <a:lstStyle/>
-          <a:p>
-            <a:pPr algn="ctr"/>
-            <a:endParaRPr lang="en-US"/>
-          </a:p>
-        </p:txBody>
-      </p:sp>
-      <p:sp>
-        <p:nvSpPr>
-          <p:cNvPr id="83" name="Rectangle 82"/>
-          <p:cNvSpPr/>
-          <p:nvPr/>
-        </p:nvSpPr>
-        <p:spPr>
-          <a:xfrm>
-            <a:off x="2895600" y="5486400"/>
-            <a:ext cx="5791200" cy="228600"/>
-          </a:xfrm>
-          <a:prstGeom prst="rect">
-            <a:avLst/>
-          </a:prstGeom>
-          <a:solidFill>
-            <a:srgbClr val="C6D9F1">
-              <a:alpha val="30196"/>
-            </a:srgbClr>
-          </a:solidFill>
-          <a:ln>
-            <a:noFill/>
-          </a:ln>
-        </p:spPr>
-        <p:style>
-          <a:lnRef idx="2">
-            <a:schemeClr val="accent1">
-              <a:shade val="50000"/>
-            </a:schemeClr>
-          </a:lnRef>
-          <a:fillRef idx="1">
-            <a:schemeClr val="accent1"/>
-          </a:fillRef>
-          <a:effectRef idx="0">
-            <a:schemeClr val="accent1"/>
-          </a:effectRef>
-          <a:fontRef idx="minor">
-            <a:schemeClr val="lt1"/>
-          </a:fontRef>
-        </p:style>
-        <p:txBody>
-          <a:bodyPr rtlCol="0" anchor="ctr"/>
-          <a:lstStyle/>
-          <a:p>
-            <a:pPr algn="ctr"/>
-            <a:endParaRPr lang="en-US"/>
-          </a:p>
-        </p:txBody>
-      </p:sp>
-      <p:sp>
-        <p:nvSpPr>
-          <p:cNvPr id="84" name="Rectangle 83"/>
-          <p:cNvSpPr/>
-          <p:nvPr/>
-        </p:nvSpPr>
-        <p:spPr>
-          <a:xfrm>
-            <a:off x="2895600" y="5943600"/>
-            <a:ext cx="5791200" cy="228600"/>
-          </a:xfrm>
-          <a:prstGeom prst="rect">
-            <a:avLst/>
-          </a:prstGeom>
-          <a:solidFill>
-            <a:srgbClr val="C6D9F1">
-              <a:alpha val="30196"/>
-            </a:srgbClr>
-          </a:solidFill>
-          <a:ln>
-            <a:noFill/>
-          </a:ln>
-        </p:spPr>
-        <p:style>
-          <a:lnRef idx="2">
-            <a:schemeClr val="accent1">
-              <a:shade val="50000"/>
-            </a:schemeClr>
-          </a:lnRef>
-          <a:fillRef idx="1">
-            <a:schemeClr val="accent1"/>
-          </a:fillRef>
-          <a:effectRef idx="0">
-            <a:schemeClr val="accent1"/>
-          </a:effectRef>
-          <a:fontRef idx="minor">
-            <a:schemeClr val="lt1"/>
-          </a:fontRef>
-        </p:style>
-        <p:txBody>
-          <a:bodyPr rtlCol="0" anchor="ctr"/>
-          <a:lstStyle/>
-          <a:p>
-            <a:pPr algn="ctr"/>
-            <a:endParaRPr lang="en-US"/>
-          </a:p>
-        </p:txBody>
-      </p:sp>
     </p:spTree>
   </p:cSld>
   <p:clrMapOvr>
@@ -13716,7 +13718,6 @@
               <a:rPr lang="en-US" sz="1000" dirty="0" smtClean="0"/>
               <a:t>$182,101.05</a:t>
             </a:r>
-            <a:endParaRPr lang="en-US" sz="1000" dirty="0" smtClean="0"/>
           </a:p>
         </p:txBody>
       </p:sp>
@@ -14409,7 +14410,6 @@
               <a:rPr lang="en-US" sz="1000" dirty="0" smtClean="0"/>
               <a:t>$182,590.05</a:t>
             </a:r>
-            <a:endParaRPr lang="en-US" sz="1000" dirty="0" smtClean="0"/>
           </a:p>
         </p:txBody>
       </p:sp>
@@ -14611,7 +14611,6 @@
               <a:rPr lang="en-US" sz="1000" dirty="0" smtClean="0"/>
               <a:t>$189,012.05</a:t>
             </a:r>
-            <a:endParaRPr lang="en-US" sz="1000" dirty="0" smtClean="0"/>
           </a:p>
         </p:txBody>
       </p:sp>
@@ -15824,15 +15823,7 @@
                   <a:schemeClr val="accent1"/>
                 </a:solidFill>
               </a:rPr>
-              <a:t>Creat</a:t>
-            </a:r>
-            <a:r>
-              <a:rPr lang="en-US" sz="1000" b="1" dirty="0" smtClean="0">
-                <a:solidFill>
-                  <a:schemeClr val="accent1"/>
-                </a:solidFill>
-              </a:rPr>
-              <a:t>e new transaction…</a:t>
+              <a:t>Create new transaction…</a:t>
             </a:r>
             <a:endParaRPr lang="en-US" sz="1000" b="1" dirty="0">
               <a:solidFill>
@@ -16317,7 +16308,6 @@
               <a:rPr lang="en-US" sz="1000" dirty="0" smtClean="0"/>
               <a:t>$182,101.05</a:t>
             </a:r>
-            <a:endParaRPr lang="en-US" sz="1000" dirty="0" smtClean="0"/>
           </a:p>
         </p:txBody>
       </p:sp>
@@ -17010,7 +17000,6 @@
               <a:rPr lang="en-US" sz="1000" dirty="0" smtClean="0"/>
               <a:t>$182,590.05</a:t>
             </a:r>
-            <a:endParaRPr lang="en-US" sz="1000" dirty="0" smtClean="0"/>
           </a:p>
         </p:txBody>
       </p:sp>
@@ -17212,7 +17201,6 @@
               <a:rPr lang="en-US" sz="1000" dirty="0" smtClean="0"/>
               <a:t>$189,012.05</a:t>
             </a:r>
-            <a:endParaRPr lang="en-US" sz="1000" dirty="0" smtClean="0"/>
           </a:p>
         </p:txBody>
       </p:sp>

</xml_diff>